<commit_message>
Wrote nanowire chapter 1
Writing 26/05/2016
</commit_message>
<xml_diff>
--- a/Figures1.pptx
+++ b/Figures1.pptx
@@ -20,6 +20,7 @@
     <p:sldId id="268" r:id="rId14"/>
     <p:sldId id="269" r:id="rId15"/>
     <p:sldId id="270" r:id="rId16"/>
+    <p:sldId id="271" r:id="rId17"/>
   </p:sldIdLst>
   <p:sldSz cx="12192000" cy="6858000"/>
   <p:notesSz cx="6858000" cy="9144000"/>
@@ -6708,6 +6709,208 @@
 </p:sld>
 </file>
 
+<file path=ppt/slides/slide16.xml><?xml version="1.0" encoding="utf-8"?>
+<p:sld xmlns:a="http://schemas.openxmlformats.org/drawingml/2006/main" xmlns:r="http://schemas.openxmlformats.org/officeDocument/2006/relationships" xmlns:p="http://schemas.openxmlformats.org/presentationml/2006/main">
+  <p:cSld>
+    <p:spTree>
+      <p:nvGrpSpPr>
+        <p:cNvPr id="1" name=""/>
+        <p:cNvGrpSpPr/>
+        <p:nvPr/>
+      </p:nvGrpSpPr>
+      <p:grpSpPr>
+        <a:xfrm>
+          <a:off x="0" y="0"/>
+          <a:ext cx="0" cy="0"/>
+          <a:chOff x="0" y="0"/>
+          <a:chExt cx="0" cy="0"/>
+        </a:xfrm>
+      </p:grpSpPr>
+      <p:grpSp>
+        <p:nvGrpSpPr>
+          <p:cNvPr id="7" name="Group 6"/>
+          <p:cNvGrpSpPr/>
+          <p:nvPr/>
+        </p:nvGrpSpPr>
+        <p:grpSpPr>
+          <a:xfrm>
+            <a:off x="473825" y="482136"/>
+            <a:ext cx="5270271" cy="2709949"/>
+            <a:chOff x="548640" y="656704"/>
+            <a:chExt cx="6874626" cy="3915296"/>
+          </a:xfrm>
+        </p:grpSpPr>
+        <p:pic>
+          <p:nvPicPr>
+            <p:cNvPr id="4" name="Picture 3"/>
+            <p:cNvPicPr>
+              <a:picLocks noChangeAspect="1"/>
+            </p:cNvPicPr>
+            <p:nvPr/>
+          </p:nvPicPr>
+          <p:blipFill rotWithShape="1">
+            <a:blip r:embed="rId2">
+              <a:extLst>
+                <a:ext uri="{28A0092B-C50C-407E-A947-70E740481C1C}">
+                  <a14:useLocalDpi xmlns:a14="http://schemas.microsoft.com/office/drawing/2010/main" val="0"/>
+                </a:ext>
+              </a:extLst>
+            </a:blip>
+            <a:srcRect l="4816" t="3279" r="1375" b="3705"/>
+            <a:stretch/>
+          </p:blipFill>
+          <p:spPr>
+            <a:xfrm>
+              <a:off x="548640" y="839585"/>
+              <a:ext cx="6874626" cy="3632662"/>
+            </a:xfrm>
+            <a:prstGeom prst="rect">
+              <a:avLst/>
+            </a:prstGeom>
+          </p:spPr>
+        </p:pic>
+        <p:sp>
+          <p:nvSpPr>
+            <p:cNvPr id="5" name="Rectangle 4"/>
+            <p:cNvSpPr/>
+            <p:nvPr/>
+          </p:nvSpPr>
+          <p:spPr>
+            <a:xfrm>
+              <a:off x="4513811" y="656705"/>
+              <a:ext cx="191193" cy="3915295"/>
+            </a:xfrm>
+            <a:prstGeom prst="rect">
+              <a:avLst/>
+            </a:prstGeom>
+            <a:solidFill>
+              <a:schemeClr val="bg1"/>
+            </a:solidFill>
+            <a:ln>
+              <a:noFill/>
+            </a:ln>
+          </p:spPr>
+          <p:style>
+            <a:lnRef idx="2">
+              <a:schemeClr val="accent1">
+                <a:shade val="50000"/>
+              </a:schemeClr>
+            </a:lnRef>
+            <a:fillRef idx="1">
+              <a:schemeClr val="accent1"/>
+            </a:fillRef>
+            <a:effectRef idx="0">
+              <a:schemeClr val="accent1"/>
+            </a:effectRef>
+            <a:fontRef idx="minor">
+              <a:schemeClr val="lt1"/>
+            </a:fontRef>
+          </p:style>
+          <p:txBody>
+            <a:bodyPr rtlCol="0" anchor="ctr"/>
+            <a:lstStyle/>
+            <a:p>
+              <a:pPr algn="ctr"/>
+              <a:endParaRPr lang="en-GB"/>
+            </a:p>
+          </p:txBody>
+        </p:sp>
+        <p:sp>
+          <p:nvSpPr>
+            <p:cNvPr id="6" name="Rectangle 5"/>
+            <p:cNvSpPr/>
+            <p:nvPr/>
+          </p:nvSpPr>
+          <p:spPr>
+            <a:xfrm>
+              <a:off x="3794760" y="656704"/>
+              <a:ext cx="191193" cy="3915295"/>
+            </a:xfrm>
+            <a:prstGeom prst="rect">
+              <a:avLst/>
+            </a:prstGeom>
+            <a:solidFill>
+              <a:schemeClr val="bg1"/>
+            </a:solidFill>
+            <a:ln>
+              <a:noFill/>
+            </a:ln>
+          </p:spPr>
+          <p:style>
+            <a:lnRef idx="2">
+              <a:schemeClr val="accent1">
+                <a:shade val="50000"/>
+              </a:schemeClr>
+            </a:lnRef>
+            <a:fillRef idx="1">
+              <a:schemeClr val="accent1"/>
+            </a:fillRef>
+            <a:effectRef idx="0">
+              <a:schemeClr val="accent1"/>
+            </a:effectRef>
+            <a:fontRef idx="minor">
+              <a:schemeClr val="lt1"/>
+            </a:fontRef>
+          </p:style>
+          <p:txBody>
+            <a:bodyPr rtlCol="0" anchor="ctr"/>
+            <a:lstStyle/>
+            <a:p>
+              <a:pPr algn="ctr"/>
+              <a:endParaRPr lang="en-GB"/>
+            </a:p>
+          </p:txBody>
+        </p:sp>
+      </p:grpSp>
+      <p:pic>
+        <p:nvPicPr>
+          <p:cNvPr id="9" name="Picture 8"/>
+          <p:cNvPicPr>
+            <a:picLocks noChangeAspect="1"/>
+          </p:cNvPicPr>
+          <p:nvPr/>
+        </p:nvPicPr>
+        <p:blipFill rotWithShape="1">
+          <a:blip r:embed="rId3" cstate="print">
+            <a:extLst>
+              <a:ext uri="{28A0092B-C50C-407E-A947-70E740481C1C}">
+                <a14:useLocalDpi xmlns:a14="http://schemas.microsoft.com/office/drawing/2010/main" val="0"/>
+              </a:ext>
+            </a:extLst>
+          </a:blip>
+          <a:srcRect r="47078"/>
+          <a:stretch/>
+        </p:blipFill>
+        <p:spPr>
+          <a:xfrm>
+            <a:off x="6148765" y="608716"/>
+            <a:ext cx="5270271" cy="3873839"/>
+          </a:xfrm>
+          <a:prstGeom prst="rect">
+            <a:avLst/>
+          </a:prstGeom>
+        </p:spPr>
+      </p:pic>
+    </p:spTree>
+    <p:extLst>
+      <p:ext uri="{BB962C8B-B14F-4D97-AF65-F5344CB8AC3E}">
+        <p14:creationId xmlns:p14="http://schemas.microsoft.com/office/powerpoint/2010/main" val="2499939470"/>
+      </p:ext>
+    </p:extLst>
+  </p:cSld>
+  <p:clrMapOvr>
+    <a:masterClrMapping/>
+  </p:clrMapOvr>
+  <p:timing>
+    <p:tnLst>
+      <p:par>
+        <p:cTn id="1" dur="indefinite" restart="never" nodeType="tmRoot"/>
+      </p:par>
+    </p:tnLst>
+  </p:timing>
+</p:sld>
+</file>
+
 <file path=ppt/slides/slide2.xml><?xml version="1.0" encoding="utf-8"?>
 <p:sld xmlns:a="http://schemas.openxmlformats.org/drawingml/2006/main" xmlns:r="http://schemas.openxmlformats.org/officeDocument/2006/relationships" xmlns:p="http://schemas.openxmlformats.org/presentationml/2006/main">
   <p:cSld>
@@ -6804,6 +7007,13 @@
   <p:clrMapOvr>
     <a:masterClrMapping/>
   </p:clrMapOvr>
+  <p:timing>
+    <p:tnLst>
+      <p:par>
+        <p:cTn id="1" dur="indefinite" restart="never" nodeType="tmRoot"/>
+      </p:par>
+    </p:tnLst>
+  </p:timing>
 </p:sld>
 </file>
 

</xml_diff>